<commit_message>
Changes in the unfolding, graphErrorPropagation specifically. Also some new slides for NTUA meeting
</commit_message>
<xml_diff>
--- a/Weekly Meetings/HEP_Weekly_20May2020.pptx
+++ b/Weekly Meetings/HEP_Weekly_20May2020.pptx
@@ -9799,6 +9799,66 @@
           </a:p>
         </p:txBody>
       </p:sp>
+      <p:pic>
+        <p:nvPicPr>
+          <p:cNvPr id="12" name="Picture 11">
+            <a:extLst>
+              <a:ext uri="{FF2B5EF4-FFF2-40B4-BE49-F238E27FC236}">
+                <a16:creationId xmlns:a16="http://schemas.microsoft.com/office/drawing/2014/main" id="{8BE20039-8075-5C42-83F5-0D2EC799568B}"/>
+              </a:ext>
+            </a:extLst>
+          </p:cNvPr>
+          <p:cNvPicPr>
+            <a:picLocks noChangeAspect="1"/>
+          </p:cNvPicPr>
+          <p:nvPr/>
+        </p:nvPicPr>
+        <p:blipFill>
+          <a:blip r:embed="rId2"/>
+          <a:stretch>
+            <a:fillRect/>
+          </a:stretch>
+        </p:blipFill>
+        <p:spPr>
+          <a:xfrm rot="5400000">
+            <a:off x="944704" y="288000"/>
+            <a:ext cx="4311269" cy="5976747"/>
+          </a:xfrm>
+          <a:prstGeom prst="rect">
+            <a:avLst/>
+          </a:prstGeom>
+        </p:spPr>
+      </p:pic>
+      <p:pic>
+        <p:nvPicPr>
+          <p:cNvPr id="14" name="Picture 13">
+            <a:extLst>
+              <a:ext uri="{FF2B5EF4-FFF2-40B4-BE49-F238E27FC236}">
+                <a16:creationId xmlns:a16="http://schemas.microsoft.com/office/drawing/2014/main" id="{8B9D37C8-C206-F040-84A5-A8622A7D512E}"/>
+              </a:ext>
+            </a:extLst>
+          </p:cNvPr>
+          <p:cNvPicPr>
+            <a:picLocks noChangeAspect="1"/>
+          </p:cNvPicPr>
+          <p:nvPr/>
+        </p:nvPicPr>
+        <p:blipFill>
+          <a:blip r:embed="rId3"/>
+          <a:stretch>
+            <a:fillRect/>
+          </a:stretch>
+        </p:blipFill>
+        <p:spPr>
+          <a:xfrm rot="5400000">
+            <a:off x="6936027" y="287999"/>
+            <a:ext cx="4311269" cy="5976747"/>
+          </a:xfrm>
+          <a:prstGeom prst="rect">
+            <a:avLst/>
+          </a:prstGeom>
+        </p:spPr>
+      </p:pic>
     </p:spTree>
     <p:extLst>
       <p:ext uri="{BB962C8B-B14F-4D97-AF65-F5344CB8AC3E}">

</xml_diff>

<commit_message>
Added some files (giannis input) to cross check. DO NOT USE THE METHOD FOR REBINNING
</commit_message>
<xml_diff>
--- a/Weekly Meetings/HEP_Weekly_20May2020.pptx
+++ b/Weekly Meetings/HEP_Weekly_20May2020.pptx
@@ -212,7 +212,7 @@
           <a:p>
             <a:fld id="{8CD5EADE-870B-3C4D-92F6-FE927CFCE2A1}" type="datetime1">
               <a:rPr lang="en-US" smtClean="0"/>
-              <a:t>5/19/20</a:t>
+              <a:t>5/20/20</a:t>
             </a:fld>
             <a:endParaRPr lang="en-GB"/>
           </a:p>
@@ -418,7 +418,7 @@
           <a:p>
             <a:fld id="{4A3A8317-869C-EC49-8CB2-3286EE886873}" type="datetime1">
               <a:rPr lang="en-US" smtClean="0"/>
-              <a:t>5/19/20</a:t>
+              <a:t>5/20/20</a:t>
             </a:fld>
             <a:endParaRPr lang="en-GB"/>
           </a:p>
@@ -752,7 +752,7 @@
           <a:p>
             <a:fld id="{B49D5E6A-E658-F947-B519-3BD764463DDB}" type="datetime1">
               <a:rPr lang="en-US" smtClean="0"/>
-              <a:t>5/19/20</a:t>
+              <a:t>5/20/20</a:t>
             </a:fld>
             <a:endParaRPr lang="en-GB"/>
           </a:p>
@@ -1020,7 +1020,7 @@
           <a:p>
             <a:fld id="{3FD6B7D5-59BD-A94A-8259-AFB77C1C6F6C}" type="datetime1">
               <a:rPr lang="en-US" smtClean="0"/>
-              <a:t>5/19/20</a:t>
+              <a:t>5/20/20</a:t>
             </a:fld>
             <a:endParaRPr lang="en-US" dirty="0"/>
           </a:p>
@@ -1227,7 +1227,7 @@
           <a:p>
             <a:fld id="{22747042-83B4-2D44-B16D-692521656AEA}" type="datetime1">
               <a:rPr lang="en-US" smtClean="0"/>
-              <a:t>5/19/20</a:t>
+              <a:t>5/20/20</a:t>
             </a:fld>
             <a:endParaRPr lang="en-US" dirty="0"/>
           </a:p>
@@ -1482,7 +1482,7 @@
           <a:p>
             <a:fld id="{123C6174-D222-ED47-AF35-85B52783FDE1}" type="datetime1">
               <a:rPr lang="en-US" smtClean="0"/>
-              <a:t>5/19/20</a:t>
+              <a:t>5/20/20</a:t>
             </a:fld>
             <a:endParaRPr lang="en-US" dirty="0"/>
           </a:p>
@@ -1673,7 +1673,7 @@
           <a:p>
             <a:fld id="{92BB3830-AA68-4343-953F-F849943EB849}" type="datetime1">
               <a:rPr lang="en-US" smtClean="0"/>
-              <a:t>5/19/20</a:t>
+              <a:t>5/20/20</a:t>
             </a:fld>
             <a:endParaRPr lang="en-GB"/>
           </a:p>
@@ -1847,7 +1847,7 @@
           <a:p>
             <a:fld id="{13F0FE4D-A637-F644-BCB7-BB01E9473082}" type="datetime1">
               <a:rPr lang="en-US" smtClean="0"/>
-              <a:t>5/19/20</a:t>
+              <a:t>5/20/20</a:t>
             </a:fld>
             <a:endParaRPr lang="en-GB"/>
           </a:p>
@@ -2097,7 +2097,7 @@
           <a:p>
             <a:fld id="{7916914C-F633-3B4D-8E7C-AF9878FBCAB2}" type="datetime1">
               <a:rPr lang="en-US" smtClean="0"/>
-              <a:t>5/19/20</a:t>
+              <a:t>5/20/20</a:t>
             </a:fld>
             <a:endParaRPr lang="en-GB"/>
           </a:p>
@@ -2333,7 +2333,7 @@
           <a:p>
             <a:fld id="{1BEE493E-6ECC-2D49-AA37-47715FC69928}" type="datetime1">
               <a:rPr lang="en-US" smtClean="0"/>
-              <a:t>5/19/20</a:t>
+              <a:t>5/20/20</a:t>
             </a:fld>
             <a:endParaRPr lang="en-GB"/>
           </a:p>
@@ -2704,7 +2704,7 @@
           <a:p>
             <a:fld id="{44D2375D-BCDA-CD42-A7D1-F6C0DA2CE615}" type="datetime1">
               <a:rPr lang="en-US" smtClean="0"/>
-              <a:t>5/19/20</a:t>
+              <a:t>5/20/20</a:t>
             </a:fld>
             <a:endParaRPr lang="en-GB"/>
           </a:p>
@@ -2826,7 +2826,7 @@
           <a:p>
             <a:fld id="{DF706FF0-E883-3242-B340-EF59CDD02701}" type="datetime1">
               <a:rPr lang="en-US" smtClean="0"/>
-              <a:t>5/19/20</a:t>
+              <a:t>5/20/20</a:t>
             </a:fld>
             <a:endParaRPr lang="en-GB"/>
           </a:p>
@@ -2925,7 +2925,7 @@
           <a:p>
             <a:fld id="{A72B1547-4678-7444-8B0B-D61236993AA6}" type="datetime1">
               <a:rPr lang="en-US" smtClean="0"/>
-              <a:t>5/19/20</a:t>
+              <a:t>5/20/20</a:t>
             </a:fld>
             <a:endParaRPr lang="en-GB"/>
           </a:p>
@@ -3206,7 +3206,7 @@
           <a:p>
             <a:fld id="{F5C0FF04-D16D-9545-B9FE-2A2509161914}" type="datetime1">
               <a:rPr lang="en-US" smtClean="0"/>
-              <a:t>5/19/20</a:t>
+              <a:t>5/20/20</a:t>
             </a:fld>
             <a:endParaRPr lang="en-GB"/>
           </a:p>
@@ -3362,7 +3362,7 @@
           <a:p>
             <a:fld id="{739BCA09-01A4-7D40-97AF-A677405590ED}" type="datetime1">
               <a:rPr lang="en-US" smtClean="0"/>
-              <a:t>5/19/20</a:t>
+              <a:t>5/20/20</a:t>
             </a:fld>
             <a:endParaRPr lang="en-US" dirty="0"/>
           </a:p>
@@ -3643,7 +3643,7 @@
           <a:p>
             <a:fld id="{95430EDC-66BF-5B4F-9F6B-EF430B2635C2}" type="datetime1">
               <a:rPr lang="en-US" smtClean="0"/>
-              <a:t>5/19/20</a:t>
+              <a:t>5/20/20</a:t>
             </a:fld>
             <a:endParaRPr lang="en-GB"/>
           </a:p>
@@ -3817,7 +3817,7 @@
           <a:p>
             <a:fld id="{C40C6D0C-61E5-A14E-AA64-932059ABBCA0}" type="datetime1">
               <a:rPr lang="en-US" smtClean="0"/>
-              <a:t>5/19/20</a:t>
+              <a:t>5/20/20</a:t>
             </a:fld>
             <a:endParaRPr lang="en-GB"/>
           </a:p>
@@ -4001,7 +4001,7 @@
           <a:p>
             <a:fld id="{686993B2-94FA-8143-ACBD-1339E5A7C63D}" type="datetime1">
               <a:rPr lang="en-US" smtClean="0"/>
-              <a:t>5/19/20</a:t>
+              <a:t>5/20/20</a:t>
             </a:fld>
             <a:endParaRPr lang="en-GB"/>
           </a:p>
@@ -4348,7 +4348,7 @@
           <a:p>
             <a:fld id="{887F3A82-5004-DE46-9B8F-C8D1AE47BCDD}" type="datetime1">
               <a:rPr lang="en-US" smtClean="0"/>
-              <a:t>5/19/20</a:t>
+              <a:t>5/20/20</a:t>
             </a:fld>
             <a:endParaRPr lang="en-US" dirty="0"/>
           </a:p>
@@ -4622,7 +4622,7 @@
           <a:p>
             <a:fld id="{9609816B-101F-E649-A6DB-1B34F62305FD}" type="datetime1">
               <a:rPr lang="en-US" smtClean="0"/>
-              <a:t>5/19/20</a:t>
+              <a:t>5/20/20</a:t>
             </a:fld>
             <a:endParaRPr lang="en-US" dirty="0"/>
           </a:p>
@@ -5000,7 +5000,7 @@
           <a:p>
             <a:fld id="{B4B9C9C3-E10A-4046-99D1-D14A01669CB5}" type="datetime1">
               <a:rPr lang="en-US" smtClean="0"/>
-              <a:t>5/19/20</a:t>
+              <a:t>5/20/20</a:t>
             </a:fld>
             <a:endParaRPr lang="en-US" dirty="0"/>
           </a:p>
@@ -5117,7 +5117,7 @@
           <a:p>
             <a:fld id="{B20DF165-EA06-4348-9825-CC0EB7B994A5}" type="datetime1">
               <a:rPr lang="en-US" smtClean="0"/>
-              <a:t>5/19/20</a:t>
+              <a:t>5/20/20</a:t>
             </a:fld>
             <a:endParaRPr lang="en-US" dirty="0"/>
           </a:p>
@@ -5287,7 +5287,7 @@
           <a:p>
             <a:fld id="{BC939BB5-C2A2-354E-94F1-11C8ABC84871}" type="datetime1">
               <a:rPr lang="en-US" smtClean="0"/>
-              <a:t>5/19/20</a:t>
+              <a:t>5/20/20</a:t>
             </a:fld>
             <a:endParaRPr lang="en-US" dirty="0"/>
           </a:p>
@@ -5671,7 +5671,7 @@
           <a:p>
             <a:fld id="{6BC13A68-213D-F04B-9D09-F80EB8CDDAAA}" type="datetime1">
               <a:rPr lang="en-US" smtClean="0"/>
-              <a:t>5/19/20</a:t>
+              <a:t>5/20/20</a:t>
             </a:fld>
             <a:endParaRPr lang="en-US" dirty="0"/>
           </a:p>
@@ -6053,7 +6053,7 @@
           <a:p>
             <a:fld id="{3C9CB665-2448-6244-98A5-6DB781AF1920}" type="datetime1">
               <a:rPr lang="en-US" smtClean="0"/>
-              <a:t>5/19/20</a:t>
+              <a:t>5/20/20</a:t>
             </a:fld>
             <a:endParaRPr lang="en-US" dirty="0"/>
           </a:p>
@@ -6339,7 +6339,7 @@
           <a:p>
             <a:fld id="{0675E229-76FC-AB46-B5B7-99D6369AD45B}" type="datetime1">
               <a:rPr lang="en-US" smtClean="0"/>
-              <a:t>5/19/20</a:t>
+              <a:t>5/20/20</a:t>
             </a:fld>
             <a:endParaRPr lang="en-US" dirty="0"/>
           </a:p>
@@ -7029,7 +7029,7 @@
           <a:p>
             <a:fld id="{69C84D11-6659-6A4A-919D-F211F249C3CD}" type="datetime1">
               <a:rPr lang="en-US" smtClean="0"/>
-              <a:t>5/19/20</a:t>
+              <a:t>5/20/20</a:t>
             </a:fld>
             <a:endParaRPr lang="en-GB"/>
           </a:p>
@@ -7683,7 +7683,7 @@
         <p:spPr>
           <a:xfrm>
             <a:off x="111966" y="607195"/>
-            <a:ext cx="11783048" cy="5509200"/>
+            <a:ext cx="11783048" cy="5847755"/>
           </a:xfrm>
           <a:prstGeom prst="rect">
             <a:avLst/>
@@ -7696,22 +7696,19 @@
           </a:bodyPr>
           <a:lstStyle/>
           <a:p>
-            <a:pPr marL="285750" indent="-285750">
+            <a:pPr marL="342900" indent="-342900">
               <a:buFont typeface="Arial" panose="020B0604020202020204" pitchFamily="34" charset="0"/>
               <a:buChar char="•"/>
             </a:pPr>
             <a:r>
-              <a:rPr lang="en-US" sz="2200" u="sng" dirty="0">
+              <a:rPr lang="en-US" sz="2200" u="sng" dirty="0" err="1">
                 <a:sym typeface="Wingdings" pitchFamily="2" charset="2"/>
               </a:rPr>
-              <a:t>Analysis</a:t>
-            </a:r>
-            <a:r>
-              <a:rPr lang="en-US" sz="2200" dirty="0">
-                <a:sym typeface="Wingdings" pitchFamily="2" charset="2"/>
-              </a:rPr>
-              <a:t>:</a:t>
-            </a:r>
+              <a:t>LHCtopWG</a:t>
+            </a:r>
+            <a:endParaRPr lang="en-US" sz="2200" u="sng" dirty="0">
+              <a:sym typeface="Wingdings" pitchFamily="2" charset="2"/>
+            </a:endParaRPr>
           </a:p>
           <a:p>
             <a:pPr marL="800100" lvl="1" indent="-342900">
@@ -7722,185 +7719,14 @@
               <a:rPr lang="en-US" sz="2200" dirty="0">
                 <a:sym typeface="Wingdings" pitchFamily="2" charset="2"/>
               </a:rPr>
-              <a:t>Training with Mass Cut (50,300)GeV @ preselection</a:t>
-            </a:r>
-          </a:p>
-          <a:p>
-            <a:pPr marL="1257300" lvl="2" indent="-342900">
-              <a:buFont typeface="Arial" panose="020B0604020202020204" pitchFamily="34" charset="0"/>
-              <a:buChar char="•"/>
-            </a:pPr>
-            <a:r>
-              <a:rPr lang="en-US" sz="2200" dirty="0">
-                <a:sym typeface="Wingdings" pitchFamily="2" charset="2"/>
-              </a:rPr>
-              <a:t>Larger ttbar contamination  vs the previous BDT that has no mass selection criteria</a:t>
-            </a:r>
-          </a:p>
-          <a:p>
-            <a:pPr marL="800100" lvl="1" indent="-342900">
-              <a:buFont typeface="Arial" panose="020B0604020202020204" pitchFamily="34" charset="0"/>
-              <a:buChar char="•"/>
-            </a:pPr>
-            <a:r>
-              <a:rPr lang="en-US" sz="2200" dirty="0">
-                <a:sym typeface="Wingdings" pitchFamily="2" charset="2"/>
-              </a:rPr>
-              <a:t>Unfolding Techniques</a:t>
-            </a:r>
-          </a:p>
-          <a:p>
-            <a:pPr marL="1257300" lvl="2" indent="-342900">
-              <a:buFont typeface="Arial" panose="020B0604020202020204" pitchFamily="34" charset="0"/>
-              <a:buChar char="•"/>
-            </a:pPr>
-            <a:r>
-              <a:rPr lang="en-US" sz="2200" dirty="0">
-                <a:sym typeface="Wingdings" pitchFamily="2" charset="2"/>
-              </a:rPr>
-              <a:t>Giannis found a way to implement the Minimum Global Correlation method using the </a:t>
-            </a:r>
-            <a:r>
-              <a:rPr lang="en-US" sz="2200" dirty="0" err="1">
-                <a:sym typeface="Wingdings" pitchFamily="2" charset="2"/>
-              </a:rPr>
-              <a:t>TUnfoldDensity</a:t>
-            </a:r>
-            <a:r>
-              <a:rPr lang="en-US" sz="2200" dirty="0">
-                <a:sym typeface="Wingdings" pitchFamily="2" charset="2"/>
-              </a:rPr>
-              <a:t> class</a:t>
-            </a:r>
-          </a:p>
-          <a:p>
-            <a:pPr marL="1257300" lvl="2" indent="-342900">
-              <a:buFont typeface="Arial" panose="020B0604020202020204" pitchFamily="34" charset="0"/>
-              <a:buChar char="•"/>
-            </a:pPr>
-            <a:r>
-              <a:rPr lang="en-US" sz="2200" dirty="0">
-                <a:sym typeface="Wingdings" pitchFamily="2" charset="2"/>
-              </a:rPr>
-              <a:t>Cross checking results</a:t>
-            </a:r>
-          </a:p>
-          <a:p>
-            <a:pPr marL="1257300" lvl="2" indent="-342900">
-              <a:buFont typeface="Arial" panose="020B0604020202020204" pitchFamily="34" charset="0"/>
-              <a:buChar char="•"/>
-            </a:pPr>
-            <a:r>
-              <a:rPr lang="en-US" sz="2200" dirty="0">
-                <a:sym typeface="Wingdings" pitchFamily="2" charset="2"/>
-              </a:rPr>
-              <a:t>Error propagation with different methods</a:t>
-            </a:r>
-          </a:p>
-          <a:p>
-            <a:pPr marL="1257300" lvl="2" indent="-342900">
-              <a:buFont typeface="Arial" panose="020B0604020202020204" pitchFamily="34" charset="0"/>
-              <a:buChar char="•"/>
-            </a:pPr>
-            <a:r>
-              <a:rPr lang="en-US" sz="2200" dirty="0">
-                <a:sym typeface="Wingdings" pitchFamily="2" charset="2"/>
-              </a:rPr>
-              <a:t>Parton and </a:t>
-            </a:r>
-            <a:r>
-              <a:rPr lang="en-US" sz="2200" u="sng" dirty="0">
-                <a:sym typeface="Wingdings" pitchFamily="2" charset="2"/>
-              </a:rPr>
-              <a:t>Particle</a:t>
-            </a:r>
-            <a:r>
-              <a:rPr lang="en-US" sz="2200" dirty="0">
-                <a:sym typeface="Wingdings" pitchFamily="2" charset="2"/>
-              </a:rPr>
-              <a:t> levels</a:t>
-            </a:r>
-          </a:p>
-          <a:p>
-            <a:pPr marL="800100" lvl="1" indent="-342900">
-              <a:buFont typeface="Arial" panose="020B0604020202020204" pitchFamily="34" charset="0"/>
-              <a:buChar char="•"/>
-            </a:pPr>
-            <a:r>
-              <a:rPr lang="en-US" sz="2200" dirty="0">
-                <a:sym typeface="Wingdings" pitchFamily="2" charset="2"/>
-              </a:rPr>
-              <a:t>Mass Fit</a:t>
-            </a:r>
-          </a:p>
-          <a:p>
-            <a:pPr marL="1257300" lvl="2" indent="-342900">
-              <a:buFont typeface="Arial" panose="020B0604020202020204" pitchFamily="34" charset="0"/>
-              <a:buChar char="•"/>
-            </a:pPr>
-            <a:r>
-              <a:rPr lang="en-US" sz="2200" dirty="0">
-                <a:sym typeface="Wingdings" pitchFamily="2" charset="2"/>
-              </a:rPr>
-              <a:t>Cannot understand why the </a:t>
-            </a:r>
-            <a:r>
-              <a:rPr lang="en-US" sz="2200" dirty="0" err="1">
-                <a:sym typeface="Wingdings" pitchFamily="2" charset="2"/>
-              </a:rPr>
-              <a:t>k</a:t>
-            </a:r>
-            <a:r>
-              <a:rPr lang="en-US" sz="2200" baseline="-25000" dirty="0" err="1">
-                <a:sym typeface="Wingdings" pitchFamily="2" charset="2"/>
-              </a:rPr>
-              <a:t>slope</a:t>
-            </a:r>
-            <a:r>
-              <a:rPr lang="en-US" sz="2200" dirty="0">
-                <a:sym typeface="Wingdings" pitchFamily="2" charset="2"/>
-              </a:rPr>
-              <a:t> is so big when we implement the fit</a:t>
-            </a:r>
-          </a:p>
-          <a:p>
-            <a:pPr marL="1714500" lvl="3" indent="-342900">
-              <a:buFont typeface="Arial" panose="020B0604020202020204" pitchFamily="34" charset="0"/>
-              <a:buChar char="•"/>
-            </a:pPr>
-            <a:r>
-              <a:rPr lang="en-US" sz="2200" dirty="0">
-                <a:sym typeface="Wingdings" pitchFamily="2" charset="2"/>
-              </a:rPr>
-              <a:t>Can it be due to statistics??</a:t>
-            </a:r>
-          </a:p>
-          <a:p>
-            <a:pPr marL="1257300" lvl="2" indent="-342900">
-              <a:buFont typeface="Arial" panose="020B0604020202020204" pitchFamily="34" charset="0"/>
-              <a:buChar char="•"/>
-            </a:pPr>
-            <a:r>
-              <a:rPr lang="en-US" sz="2200" dirty="0">
-                <a:sym typeface="Wingdings" pitchFamily="2" charset="2"/>
-              </a:rPr>
-              <a:t>Simultaneous fit seems to have better results (</a:t>
-            </a:r>
-            <a:r>
-              <a:rPr lang="en-US" sz="2200" dirty="0" err="1">
-                <a:sym typeface="Wingdings" pitchFamily="2" charset="2"/>
-              </a:rPr>
-              <a:t>qcd</a:t>
-            </a:r>
-            <a:r>
-              <a:rPr lang="en-US" sz="2200" dirty="0">
-                <a:sym typeface="Wingdings" pitchFamily="2" charset="2"/>
-              </a:rPr>
-              <a:t> params are frozen)</a:t>
-            </a:r>
-          </a:p>
-          <a:p>
-            <a:pPr marL="342900" indent="-342900">
+              <a:t>TOP-18-013 presentation</a:t>
+            </a:r>
+            <a:endParaRPr lang="en-US" sz="2200" b="1" u="sng" dirty="0">
+              <a:sym typeface="Wingdings" pitchFamily="2" charset="2"/>
+            </a:endParaRPr>
+          </a:p>
+          <a:p>
+            <a:pPr marL="285750" indent="-285750">
               <a:buFont typeface="Arial" panose="020B0604020202020204" pitchFamily="34" charset="0"/>
               <a:buChar char="•"/>
             </a:pPr>
@@ -7909,19 +7735,22 @@
             </a:endParaRPr>
           </a:p>
           <a:p>
-            <a:pPr marL="342900" indent="-342900">
+            <a:pPr marL="285750" indent="-285750">
               <a:buFont typeface="Arial" panose="020B0604020202020204" pitchFamily="34" charset="0"/>
               <a:buChar char="•"/>
             </a:pPr>
             <a:r>
-              <a:rPr lang="en-US" sz="2200" u="sng" dirty="0" err="1">
+              <a:rPr lang="en-US" sz="2200" u="sng" dirty="0">
                 <a:sym typeface="Wingdings" pitchFamily="2" charset="2"/>
               </a:rPr>
-              <a:t>LHCtopWG</a:t>
-            </a:r>
-            <a:endParaRPr lang="en-US" sz="2200" u="sng" dirty="0">
-              <a:sym typeface="Wingdings" pitchFamily="2" charset="2"/>
-            </a:endParaRPr>
+              <a:t>Analysis</a:t>
+            </a:r>
+            <a:r>
+              <a:rPr lang="en-US" sz="2200" dirty="0">
+                <a:sym typeface="Wingdings" pitchFamily="2" charset="2"/>
+              </a:rPr>
+              <a:t>:</a:t>
+            </a:r>
           </a:p>
           <a:p>
             <a:pPr marL="800100" lvl="1" indent="-342900">
@@ -7932,8 +7761,187 @@
               <a:rPr lang="en-US" sz="2200" dirty="0">
                 <a:sym typeface="Wingdings" pitchFamily="2" charset="2"/>
               </a:rPr>
-              <a:t>TOP-18-013 presentation</a:t>
-            </a:r>
+              <a:t>Training with Mass Cut (50,300)GeV @ preselection</a:t>
+            </a:r>
+          </a:p>
+          <a:p>
+            <a:pPr marL="1257300" lvl="2" indent="-342900">
+              <a:buFont typeface="Arial" panose="020B0604020202020204" pitchFamily="34" charset="0"/>
+              <a:buChar char="•"/>
+            </a:pPr>
+            <a:r>
+              <a:rPr lang="en-US" sz="2200" dirty="0">
+                <a:sym typeface="Wingdings" pitchFamily="2" charset="2"/>
+              </a:rPr>
+              <a:t>Larger ttbar contamination  vs the previous BDT that has no mass selection criteria</a:t>
+            </a:r>
+          </a:p>
+          <a:p>
+            <a:pPr marL="800100" lvl="1" indent="-342900">
+              <a:buFont typeface="Arial" panose="020B0604020202020204" pitchFamily="34" charset="0"/>
+              <a:buChar char="•"/>
+            </a:pPr>
+            <a:r>
+              <a:rPr lang="en-US" sz="2200" dirty="0">
+                <a:sym typeface="Wingdings" pitchFamily="2" charset="2"/>
+              </a:rPr>
+              <a:t>Unfolding Techniques</a:t>
+            </a:r>
+          </a:p>
+          <a:p>
+            <a:pPr marL="1257300" lvl="2" indent="-342900">
+              <a:buFont typeface="Arial" panose="020B0604020202020204" pitchFamily="34" charset="0"/>
+              <a:buChar char="•"/>
+            </a:pPr>
+            <a:r>
+              <a:rPr lang="en-US" sz="2200" dirty="0">
+                <a:sym typeface="Wingdings" pitchFamily="2" charset="2"/>
+              </a:rPr>
+              <a:t>Giannis found a way to implement the Minimum Global Correlation method using the </a:t>
+            </a:r>
+            <a:r>
+              <a:rPr lang="en-US" sz="2200" dirty="0" err="1">
+                <a:sym typeface="Wingdings" pitchFamily="2" charset="2"/>
+              </a:rPr>
+              <a:t>TUnfoldDensity</a:t>
+            </a:r>
+            <a:r>
+              <a:rPr lang="en-US" sz="2200" dirty="0">
+                <a:sym typeface="Wingdings" pitchFamily="2" charset="2"/>
+              </a:rPr>
+              <a:t> class</a:t>
+            </a:r>
+          </a:p>
+          <a:p>
+            <a:pPr marL="1257300" lvl="2" indent="-342900">
+              <a:buFont typeface="Arial" panose="020B0604020202020204" pitchFamily="34" charset="0"/>
+              <a:buChar char="•"/>
+            </a:pPr>
+            <a:r>
+              <a:rPr lang="en-US" sz="2200" dirty="0">
+                <a:sym typeface="Wingdings" pitchFamily="2" charset="2"/>
+              </a:rPr>
+              <a:t>Cross checking results</a:t>
+            </a:r>
+          </a:p>
+          <a:p>
+            <a:pPr marL="1257300" lvl="2" indent="-342900">
+              <a:buFont typeface="Arial" panose="020B0604020202020204" pitchFamily="34" charset="0"/>
+              <a:buChar char="•"/>
+            </a:pPr>
+            <a:r>
+              <a:rPr lang="en-US" sz="2200" dirty="0">
+                <a:sym typeface="Wingdings" pitchFamily="2" charset="2"/>
+              </a:rPr>
+              <a:t>Error propagation with different methods</a:t>
+            </a:r>
+          </a:p>
+          <a:p>
+            <a:pPr marL="1257300" lvl="2" indent="-342900">
+              <a:buFont typeface="Arial" panose="020B0604020202020204" pitchFamily="34" charset="0"/>
+              <a:buChar char="•"/>
+            </a:pPr>
+            <a:r>
+              <a:rPr lang="en-US" sz="2200" dirty="0">
+                <a:sym typeface="Wingdings" pitchFamily="2" charset="2"/>
+              </a:rPr>
+              <a:t>Parton and </a:t>
+            </a:r>
+            <a:r>
+              <a:rPr lang="en-US" sz="2200" u="sng" dirty="0">
+                <a:sym typeface="Wingdings" pitchFamily="2" charset="2"/>
+              </a:rPr>
+              <a:t>Particle</a:t>
+            </a:r>
+            <a:r>
+              <a:rPr lang="en-US" sz="2200" dirty="0">
+                <a:sym typeface="Wingdings" pitchFamily="2" charset="2"/>
+              </a:rPr>
+              <a:t> levels</a:t>
+            </a:r>
+          </a:p>
+          <a:p>
+            <a:pPr marL="800100" lvl="1" indent="-342900">
+              <a:buFont typeface="Arial" panose="020B0604020202020204" pitchFamily="34" charset="0"/>
+              <a:buChar char="•"/>
+            </a:pPr>
+            <a:r>
+              <a:rPr lang="en-US" sz="2200" dirty="0">
+                <a:sym typeface="Wingdings" pitchFamily="2" charset="2"/>
+              </a:rPr>
+              <a:t>Mass Fit</a:t>
+            </a:r>
+          </a:p>
+          <a:p>
+            <a:pPr marL="1257300" lvl="2" indent="-342900">
+              <a:buFont typeface="Arial" panose="020B0604020202020204" pitchFamily="34" charset="0"/>
+              <a:buChar char="•"/>
+            </a:pPr>
+            <a:r>
+              <a:rPr lang="en-US" sz="2200" dirty="0">
+                <a:sym typeface="Wingdings" pitchFamily="2" charset="2"/>
+              </a:rPr>
+              <a:t>Cannot understand why the </a:t>
+            </a:r>
+            <a:r>
+              <a:rPr lang="en-US" sz="2200" dirty="0" err="1">
+                <a:sym typeface="Wingdings" pitchFamily="2" charset="2"/>
+              </a:rPr>
+              <a:t>k</a:t>
+            </a:r>
+            <a:r>
+              <a:rPr lang="en-US" sz="2200" baseline="-25000" dirty="0" err="1">
+                <a:sym typeface="Wingdings" pitchFamily="2" charset="2"/>
+              </a:rPr>
+              <a:t>slope</a:t>
+            </a:r>
+            <a:r>
+              <a:rPr lang="en-US" sz="2200" dirty="0">
+                <a:sym typeface="Wingdings" pitchFamily="2" charset="2"/>
+              </a:rPr>
+              <a:t> is so big when we implement the fit</a:t>
+            </a:r>
+          </a:p>
+          <a:p>
+            <a:pPr marL="1714500" lvl="3" indent="-342900">
+              <a:buFont typeface="Arial" panose="020B0604020202020204" pitchFamily="34" charset="0"/>
+              <a:buChar char="•"/>
+            </a:pPr>
+            <a:r>
+              <a:rPr lang="en-US" sz="2200" dirty="0">
+                <a:sym typeface="Wingdings" pitchFamily="2" charset="2"/>
+              </a:rPr>
+              <a:t>Can it be due to statistics??</a:t>
+            </a:r>
+          </a:p>
+          <a:p>
+            <a:pPr marL="1257300" lvl="2" indent="-342900">
+              <a:buFont typeface="Arial" panose="020B0604020202020204" pitchFamily="34" charset="0"/>
+              <a:buChar char="•"/>
+            </a:pPr>
+            <a:r>
+              <a:rPr lang="en-US" sz="2200" dirty="0">
+                <a:sym typeface="Wingdings" pitchFamily="2" charset="2"/>
+              </a:rPr>
+              <a:t>Simultaneous fit seems to have better results (</a:t>
+            </a:r>
+            <a:r>
+              <a:rPr lang="en-US" sz="2200" dirty="0" err="1">
+                <a:sym typeface="Wingdings" pitchFamily="2" charset="2"/>
+              </a:rPr>
+              <a:t>qcd</a:t>
+            </a:r>
+            <a:r>
+              <a:rPr lang="en-US" sz="2200" dirty="0">
+                <a:sym typeface="Wingdings" pitchFamily="2" charset="2"/>
+              </a:rPr>
+              <a:t> params are frozen)</a:t>
+            </a:r>
+          </a:p>
+          <a:p>
+            <a:endParaRPr lang="en-US" sz="2200" u="sng" dirty="0">
+              <a:sym typeface="Wingdings" pitchFamily="2" charset="2"/>
+            </a:endParaRPr>
           </a:p>
         </p:txBody>
       </p:sp>
@@ -7990,7 +7998,7 @@
           <a:p>
             <a:fld id="{A495A033-A54B-4F41-92C4-F7053274BB0C}" type="datetime1">
               <a:rPr lang="en-US" smtClean="0"/>
-              <a:t>5/19/20</a:t>
+              <a:t>5/20/20</a:t>
             </a:fld>
             <a:endParaRPr lang="en-US" dirty="0"/>
           </a:p>
@@ -8151,7 +8159,7 @@
           <a:p>
             <a:fld id="{A495A033-A54B-4F41-92C4-F7053274BB0C}" type="datetime1">
               <a:rPr lang="en-US" smtClean="0"/>
-              <a:t>5/19/20</a:t>
+              <a:t>5/20/20</a:t>
             </a:fld>
             <a:endParaRPr lang="en-US" dirty="0"/>
           </a:p>
@@ -8394,8 +8402,8 @@
           </a:p>
         </p:txBody>
       </p:sp>
-      <mc:AlternateContent xmlns:mc="http://schemas.openxmlformats.org/markup-compatibility/2006">
-        <mc:Choice xmlns:a14="http://schemas.microsoft.com/office/drawing/2010/main" Requires="a14">
+      <mc:AlternateContent xmlns:mc="http://schemas.openxmlformats.org/markup-compatibility/2006" xmlns:a14="http://schemas.microsoft.com/office/drawing/2010/main">
+        <mc:Choice Requires="a14">
           <p:sp>
             <p:nvSpPr>
               <p:cNvPr id="6" name="TextBox 5">
@@ -8984,7 +8992,7 @@
             </p:txBody>
           </p:sp>
         </mc:Choice>
-        <mc:Fallback>
+        <mc:Fallback xmlns="">
           <p:sp>
             <p:nvSpPr>
               <p:cNvPr id="6" name="TextBox 5">
@@ -9082,7 +9090,7 @@
           <a:p>
             <a:fld id="{A495A033-A54B-4F41-92C4-F7053274BB0C}" type="datetime1">
               <a:rPr lang="en-US" smtClean="0"/>
-              <a:t>5/19/20</a:t>
+              <a:t>5/20/20</a:t>
             </a:fld>
             <a:endParaRPr lang="en-US" dirty="0"/>
           </a:p>
@@ -9227,7 +9235,7 @@
           <a:p>
             <a:fld id="{A495A033-A54B-4F41-92C4-F7053274BB0C}" type="datetime1">
               <a:rPr lang="en-US" smtClean="0"/>
-              <a:t>5/19/20</a:t>
+              <a:t>5/20/20</a:t>
             </a:fld>
             <a:endParaRPr lang="en-US" dirty="0"/>
           </a:p>
@@ -9510,7 +9518,7 @@
           <a:p>
             <a:fld id="{A495A033-A54B-4F41-92C4-F7053274BB0C}" type="datetime1">
               <a:rPr lang="en-US" smtClean="0"/>
-              <a:t>5/19/20</a:t>
+              <a:t>5/20/20</a:t>
             </a:fld>
             <a:endParaRPr lang="en-US" dirty="0"/>
           </a:p>
@@ -9793,7 +9801,7 @@
           <a:p>
             <a:fld id="{A495A033-A54B-4F41-92C4-F7053274BB0C}" type="datetime1">
               <a:rPr lang="en-US" smtClean="0"/>
-              <a:t>5/19/20</a:t>
+              <a:t>5/20/20</a:t>
             </a:fld>
             <a:endParaRPr lang="en-US" dirty="0"/>
           </a:p>
@@ -9998,7 +10006,7 @@
           <a:p>
             <a:fld id="{A495A033-A54B-4F41-92C4-F7053274BB0C}" type="datetime1">
               <a:rPr lang="en-US" smtClean="0"/>
-              <a:t>5/19/20</a:t>
+              <a:t>5/20/20</a:t>
             </a:fld>
             <a:endParaRPr lang="en-US" dirty="0"/>
           </a:p>
@@ -10307,14 +10315,14 @@
           <a:p>
             <a:fld id="{A495A033-A54B-4F41-92C4-F7053274BB0C}" type="datetime1">
               <a:rPr lang="en-US" smtClean="0"/>
-              <a:t>5/19/20</a:t>
+              <a:t>5/20/20</a:t>
             </a:fld>
             <a:endParaRPr lang="en-US" dirty="0"/>
           </a:p>
         </p:txBody>
       </p:sp>
-      <mc:AlternateContent xmlns:mc="http://schemas.openxmlformats.org/markup-compatibility/2006">
-        <mc:Choice xmlns:a14="http://schemas.microsoft.com/office/drawing/2010/main" Requires="a14">
+      <mc:AlternateContent xmlns:mc="http://schemas.openxmlformats.org/markup-compatibility/2006" xmlns:a14="http://schemas.microsoft.com/office/drawing/2010/main">
+        <mc:Choice Requires="a14">
           <p:sp>
             <p:nvSpPr>
               <p:cNvPr id="8" name="Rectangle 7">
@@ -10941,7 +10949,7 @@
             </p:txBody>
           </p:sp>
         </mc:Choice>
-        <mc:Fallback>
+        <mc:Fallback xmlns="">
           <p:sp>
             <p:nvSpPr>
               <p:cNvPr id="8" name="Rectangle 7">

</xml_diff>